<commit_message>
re-finding repository new mac
</commit_message>
<xml_diff>
--- a/BSR Documents/BSR Backlog Slides Poster v3.pptx
+++ b/BSR Documents/BSR Backlog Slides Poster v3.pptx
@@ -5245,7 +5245,27 @@
                   <a:latin typeface="Raleway" pitchFamily="2" charset="77"/>
                   <a:cs typeface="Helvetica" panose="020B0604020202020204" pitchFamily="34" charset="0"/>
                 </a:rPr>
-                <a:t>A backlog of 6812 patients without an allocated follow-up appointment</a:t>
+                <a:t>A </a:t>
+              </a:r>
+              <a:r>
+                <a:rPr lang="en-GB" sz="1400" b="1" kern="0" dirty="0">
+                  <a:solidFill>
+                    <a:srgbClr val="000000"/>
+                  </a:solidFill>
+                  <a:latin typeface="Raleway" pitchFamily="2" charset="77"/>
+                  <a:cs typeface="Helvetica" panose="020B0604020202020204" pitchFamily="34" charset="0"/>
+                </a:rPr>
+                <a:t>backlog</a:t>
+              </a:r>
+              <a:r>
+                <a:rPr lang="en-GB" sz="1400" kern="0" dirty="0">
+                  <a:solidFill>
+                    <a:srgbClr val="000000"/>
+                  </a:solidFill>
+                  <a:latin typeface="Raleway" pitchFamily="2" charset="77"/>
+                  <a:cs typeface="Helvetica" panose="020B0604020202020204" pitchFamily="34" charset="0"/>
+                </a:rPr>
+                <a:t> of 6812 patients without an allocated follow-up appointment</a:t>
               </a:r>
               <a:r>
                 <a:rPr lang="en-GB" sz="1400" u="sng" kern="0" dirty="0">
@@ -5296,7 +5316,7 @@
                   <a:latin typeface="Raleway" pitchFamily="2" charset="77"/>
                   <a:cs typeface="Helvetica" panose="020B0604020202020204" pitchFamily="34" charset="0"/>
                 </a:rPr>
-                <a:t>We aimed to analysed attempts to deliver care remotely to patients on the backlog using:</a:t>
+                <a:t>We aimed to analyse attempts to deliver care remotely to patients on the backlog using:</a:t>
               </a:r>
             </a:p>
             <a:p>
@@ -5893,7 +5913,7 @@
             <p:spPr>
               <a:xfrm>
                 <a:off x="817798" y="520367"/>
-                <a:ext cx="13239463" cy="2602863"/>
+                <a:ext cx="13239463" cy="2398718"/>
               </a:xfrm>
               <a:prstGeom prst="rect">
                 <a:avLst/>
@@ -5917,7 +5937,7 @@
                     <a:latin typeface="Raleway" pitchFamily="2" charset="77"/>
                     <a:cs typeface="Helvetica" panose="020B0604020202020204" pitchFamily="34" charset="0"/>
                   </a:rPr>
-                  <a:t>We focussed on patients whose last appointment was between May 2020-May 2021 This was initially </a:t>
+                  <a:t>We focussed on the </a:t>
                 </a:r>
                 <a:r>
                   <a:rPr lang="en-GB" sz="1400" b="1" kern="0" dirty="0">
@@ -5927,7 +5947,7 @@
                     <a:latin typeface="Raleway" pitchFamily="2" charset="77"/>
                     <a:cs typeface="Helvetica" panose="020B0604020202020204" pitchFamily="34" charset="0"/>
                   </a:rPr>
-                  <a:t>3259 patients </a:t>
+                  <a:t>3259</a:t>
                 </a:r>
                 <a:r>
                   <a:rPr lang="en-GB" sz="1400" kern="0" dirty="0">
@@ -5937,13 +5957,28 @@
                     <a:latin typeface="Raleway" pitchFamily="2" charset="77"/>
                     <a:cs typeface="Helvetica" panose="020B0604020202020204" pitchFamily="34" charset="0"/>
                   </a:rPr>
-                  <a:t>out of the total backlog of 6812. </a:t>
+                  <a:t> </a:t>
                 </a:r>
-              </a:p>
-              <a:p>
-                <a:pPr defTabSz="1751511">
-                  <a:defRPr/>
-                </a:pPr>
+                <a:r>
+                  <a:rPr lang="en-GB" sz="1400" b="1" kern="0" dirty="0">
+                    <a:solidFill>
+                      <a:srgbClr val="000000"/>
+                    </a:solidFill>
+                    <a:latin typeface="Raleway" pitchFamily="2" charset="77"/>
+                    <a:cs typeface="Helvetica" panose="020B0604020202020204" pitchFamily="34" charset="0"/>
+                  </a:rPr>
+                  <a:t>patients</a:t>
+                </a:r>
+                <a:r>
+                  <a:rPr lang="en-GB" sz="1400" kern="0" dirty="0">
+                    <a:solidFill>
+                      <a:srgbClr val="000000"/>
+                    </a:solidFill>
+                    <a:latin typeface="Raleway" pitchFamily="2" charset="77"/>
+                    <a:cs typeface="Helvetica" panose="020B0604020202020204" pitchFamily="34" charset="0"/>
+                  </a:rPr>
+                  <a:t> whose last appointment was between May 2020 and May 2021.</a:t>
+                </a:r>
                 <a:endParaRPr lang="en-GB" sz="800" kern="0" dirty="0">
                   <a:solidFill>
                     <a:srgbClr val="000000"/>
@@ -5976,17 +6011,7 @@
                     <a:latin typeface="Raleway" pitchFamily="2" charset="77"/>
                     <a:cs typeface="Helvetica" panose="020B0604020202020204" pitchFamily="34" charset="0"/>
                   </a:rPr>
-                  <a:t>We studied the this on four occasions between September ‘21 and September ‘22: at </a:t>
-                </a:r>
-                <a:r>
-                  <a:rPr lang="en-GB" sz="1400" b="1" kern="0" dirty="0">
-                    <a:solidFill>
-                      <a:srgbClr val="000000"/>
-                    </a:solidFill>
-                    <a:latin typeface="Raleway" pitchFamily="2" charset="77"/>
-                    <a:cs typeface="Helvetica" panose="020B0604020202020204" pitchFamily="34" charset="0"/>
-                  </a:rPr>
-                  <a:t>baseline, then at 1, 2, 6 and 12-months</a:t>
+                  <a:t>We re-looked at this portion of the backlog on four occasions between September ‘21 and September ’22 to assess how many still remained to be seen: at baseline, then at 1, 2, 6 and 12-months</a:t>
                 </a:r>
                 <a:endParaRPr lang="en-GB" sz="1100" kern="0" dirty="0">
                   <a:solidFill>
@@ -7407,6 +7432,195 @@
           </a:prstGeom>
         </p:spPr>
       </p:pic>
+      <p:grpSp>
+        <p:nvGrpSpPr>
+          <p:cNvPr id="6" name="Group 5">
+            <a:extLst>
+              <a:ext uri="{FF2B5EF4-FFF2-40B4-BE49-F238E27FC236}">
+                <a16:creationId xmlns:a16="http://schemas.microsoft.com/office/drawing/2014/main" id="{F790E477-80D0-395F-8E4A-8552C7591699}"/>
+              </a:ext>
+            </a:extLst>
+          </p:cNvPr>
+          <p:cNvGrpSpPr/>
+          <p:nvPr/>
+        </p:nvGrpSpPr>
+        <p:grpSpPr>
+          <a:xfrm>
+            <a:off x="9750221" y="195411"/>
+            <a:ext cx="2216049" cy="1277251"/>
+            <a:chOff x="9750221" y="195411"/>
+            <a:chExt cx="2216049" cy="1277251"/>
+          </a:xfrm>
+        </p:grpSpPr>
+        <p:sp>
+          <p:nvSpPr>
+            <p:cNvPr id="12" name="Google Shape;191;p10">
+              <a:extLst>
+                <a:ext uri="{FF2B5EF4-FFF2-40B4-BE49-F238E27FC236}">
+                  <a16:creationId xmlns:a16="http://schemas.microsoft.com/office/drawing/2014/main" id="{4DB6F6FC-9E7D-47A7-087C-F3E98A9EB7F6}"/>
+                </a:ext>
+              </a:extLst>
+            </p:cNvPr>
+            <p:cNvSpPr/>
+            <p:nvPr/>
+          </p:nvSpPr>
+          <p:spPr>
+            <a:xfrm>
+              <a:off x="9750221" y="359201"/>
+              <a:ext cx="2216049" cy="1113461"/>
+            </a:xfrm>
+            <a:custGeom>
+              <a:avLst/>
+              <a:gdLst/>
+              <a:ahLst/>
+              <a:cxnLst/>
+              <a:rect l="l" t="t" r="r" b="b"/>
+              <a:pathLst>
+                <a:path w="3379367" h="2027620" extrusionOk="0">
+                  <a:moveTo>
+                    <a:pt x="0" y="0"/>
+                  </a:moveTo>
+                  <a:lnTo>
+                    <a:pt x="3379367" y="0"/>
+                  </a:lnTo>
+                  <a:lnTo>
+                    <a:pt x="3379367" y="2027620"/>
+                  </a:lnTo>
+                  <a:lnTo>
+                    <a:pt x="0" y="2027620"/>
+                  </a:lnTo>
+                  <a:lnTo>
+                    <a:pt x="0" y="0"/>
+                  </a:lnTo>
+                  <a:close/>
+                </a:path>
+              </a:pathLst>
+            </a:custGeom>
+            <a:noFill/>
+            <a:ln>
+              <a:noFill/>
+            </a:ln>
+          </p:spPr>
+          <p:txBody>
+            <a:bodyPr spcFirstLastPara="1" wrap="square" lIns="360000" tIns="450000" rIns="360000" bIns="360000" anchor="t" anchorCtr="0">
+              <a:noAutofit/>
+            </a:bodyPr>
+            <a:lstStyle/>
+            <a:p>
+              <a:pPr marL="0" marR="0" lvl="1" indent="0" rtl="0">
+                <a:lnSpc>
+                  <a:spcPct val="90000"/>
+                </a:lnSpc>
+                <a:spcBef>
+                  <a:spcPts val="0"/>
+                </a:spcBef>
+                <a:spcAft>
+                  <a:spcPts val="0"/>
+                </a:spcAft>
+                <a:buClr>
+                  <a:srgbClr val="000000"/>
+                </a:buClr>
+                <a:buSzPts val="1200"/>
+                <a:buFont typeface="Raleway"/>
+                <a:buNone/>
+              </a:pPr>
+              <a:r>
+                <a:rPr lang="en-GB" sz="1400" b="1" i="0" u="none" strike="noStrike" cap="none" dirty="0">
+                  <a:solidFill>
+                    <a:srgbClr val="C00000"/>
+                  </a:solidFill>
+                  <a:latin typeface="Raleway"/>
+                  <a:ea typeface="Raleway"/>
+                  <a:cs typeface="Raleway"/>
+                  <a:sym typeface="Raleway"/>
+                </a:rPr>
+                <a:t>Scan the QR Code for more detail!</a:t>
+              </a:r>
+            </a:p>
+            <a:p>
+              <a:pPr marL="0" marR="0" lvl="1" indent="0" algn="l" rtl="0">
+                <a:lnSpc>
+                  <a:spcPct val="90000"/>
+                </a:lnSpc>
+                <a:spcBef>
+                  <a:spcPts val="0"/>
+                </a:spcBef>
+                <a:spcAft>
+                  <a:spcPts val="0"/>
+                </a:spcAft>
+                <a:buClr>
+                  <a:srgbClr val="000000"/>
+                </a:buClr>
+                <a:buSzPts val="1200"/>
+                <a:buFont typeface="Raleway"/>
+                <a:buNone/>
+              </a:pPr>
+              <a:endParaRPr lang="en-GB" sz="1400" b="1" i="0" u="none" strike="noStrike" cap="none" dirty="0">
+                <a:solidFill>
+                  <a:srgbClr val="C00000"/>
+                </a:solidFill>
+                <a:latin typeface="Raleway"/>
+                <a:ea typeface="Raleway"/>
+                <a:cs typeface="Raleway"/>
+                <a:sym typeface="Raleway"/>
+              </a:endParaRPr>
+            </a:p>
+          </p:txBody>
+        </p:sp>
+        <p:sp>
+          <p:nvSpPr>
+            <p:cNvPr id="13" name="Arc 12">
+              <a:extLst>
+                <a:ext uri="{FF2B5EF4-FFF2-40B4-BE49-F238E27FC236}">
+                  <a16:creationId xmlns:a16="http://schemas.microsoft.com/office/drawing/2014/main" id="{0AD45C25-0B2B-42D4-0812-C031CDA644A1}"/>
+                </a:ext>
+              </a:extLst>
+            </p:cNvPr>
+            <p:cNvSpPr/>
+            <p:nvPr/>
+          </p:nvSpPr>
+          <p:spPr>
+            <a:xfrm rot="1406549" flipV="1">
+              <a:off x="11265460" y="195411"/>
+              <a:ext cx="632327" cy="1042879"/>
+            </a:xfrm>
+            <a:prstGeom prst="arc">
+              <a:avLst/>
+            </a:prstGeom>
+            <a:ln w="38100" cap="flat" cmpd="sng" algn="ctr">
+              <a:solidFill>
+                <a:schemeClr val="accent1"/>
+              </a:solidFill>
+              <a:prstDash val="solid"/>
+              <a:round/>
+              <a:headEnd type="none" w="med" len="med"/>
+              <a:tailEnd type="arrow" w="med" len="med"/>
+            </a:ln>
+          </p:spPr>
+          <p:style>
+            <a:lnRef idx="0">
+              <a:scrgbClr r="0" g="0" b="0"/>
+            </a:lnRef>
+            <a:fillRef idx="0">
+              <a:scrgbClr r="0" g="0" b="0"/>
+            </a:fillRef>
+            <a:effectRef idx="0">
+              <a:scrgbClr r="0" g="0" b="0"/>
+            </a:effectRef>
+            <a:fontRef idx="minor">
+              <a:schemeClr val="tx1"/>
+            </a:fontRef>
+          </p:style>
+          <p:txBody>
+            <a:bodyPr rtlCol="0" anchor="ctr"/>
+            <a:lstStyle/>
+            <a:p>
+              <a:pPr algn="ctr"/>
+              <a:endParaRPr lang="en-US"/>
+            </a:p>
+          </p:txBody>
+        </p:sp>
+      </p:grpSp>
     </p:spTree>
   </p:cSld>
   <p:clrMapOvr>
@@ -7699,7 +7913,7 @@
                 <a:latin typeface="Raleway" pitchFamily="2" charset="77"/>
                 <a:cs typeface="Helvetica" panose="020B0604020202020204" pitchFamily="34" charset="0"/>
               </a:rPr>
-              <a:t> were completed between Sep-21 - Mar-22 (no data available since then) </a:t>
+              <a:t> forms were completed between September 2021 &amp; March 2022. </a:t>
             </a:r>
           </a:p>
           <a:p>
@@ -7733,7 +7947,7 @@
                 <a:latin typeface="Raleway" pitchFamily="2" charset="77"/>
                 <a:cs typeface="Helvetica" panose="020B0604020202020204" pitchFamily="34" charset="0"/>
               </a:rPr>
-              <a:t>154/261 (59%) </a:t>
+              <a:t>154/261 (59%) were completed by patients on the backlog</a:t>
             </a:r>
             <a:r>
               <a:rPr lang="en-GB" sz="1400" kern="0" dirty="0">
@@ -7743,7 +7957,7 @@
                 <a:latin typeface="Raleway" pitchFamily="2" charset="77"/>
                 <a:cs typeface="Helvetica" panose="020B0604020202020204" pitchFamily="34" charset="0"/>
               </a:rPr>
-              <a:t>were completed by patients on the backlog between May-20 - May-21, indicating a </a:t>
+              <a:t> between May ‘20 – May '21, indicating a </a:t>
             </a:r>
             <a:r>
               <a:rPr lang="en-GB" sz="1400" b="1" kern="0" dirty="0">
@@ -7763,16 +7977,6 @@
               <a:defRPr/>
             </a:pPr>
             <a:r>
-              <a:rPr lang="en-GB" sz="1400" b="1" kern="0" dirty="0">
-                <a:solidFill>
-                  <a:srgbClr val="000000"/>
-                </a:solidFill>
-                <a:latin typeface="Raleway" pitchFamily="2" charset="77"/>
-                <a:cs typeface="Helvetica" panose="020B0604020202020204" pitchFamily="34" charset="0"/>
-              </a:rPr>
-              <a:t>5%</a:t>
-            </a:r>
-            <a:r>
               <a:rPr lang="en-GB" sz="1400" kern="0" dirty="0">
                 <a:solidFill>
                   <a:srgbClr val="000000"/>
@@ -7780,7 +7984,7 @@
                 <a:latin typeface="Raleway" pitchFamily="2" charset="77"/>
                 <a:cs typeface="Helvetica" panose="020B0604020202020204" pitchFamily="34" charset="0"/>
               </a:rPr>
-              <a:t> of all backlog patients were managed with RMFs (based on available data).</a:t>
+              <a:t>5% of all backlog patients were managed with RMFs (based on available data).</a:t>
             </a:r>
           </a:p>
         </p:txBody>
@@ -10290,9 +10494,9 @@
         <p:grpSpPr>
           <a:xfrm>
             <a:off x="492705" y="2023060"/>
-            <a:ext cx="5946195" cy="4547345"/>
+            <a:ext cx="5946195" cy="4493872"/>
             <a:chOff x="492705" y="2023060"/>
-            <a:chExt cx="5946195" cy="4547345"/>
+            <a:chExt cx="5946195" cy="4493872"/>
           </a:xfrm>
         </p:grpSpPr>
         <p:sp>
@@ -10303,8 +10507,8 @@
           </p:nvSpPr>
           <p:spPr>
             <a:xfrm>
-              <a:off x="807059" y="5532957"/>
-              <a:ext cx="5460517" cy="1037448"/>
+              <a:off x="735543" y="5479484"/>
+              <a:ext cx="5703357" cy="1037448"/>
             </a:xfrm>
             <a:custGeom>
               <a:avLst/>
@@ -10341,7 +10545,9 @@
             </a:bodyPr>
             <a:lstStyle/>
             <a:p>
-              <a:pPr defTabSz="1751511">
+              <a:pPr marL="285750" indent="-285750" defTabSz="1751511">
+                <a:buFont typeface="Arial" panose="020B0604020202020204" pitchFamily="34" charset="0"/>
+                <a:buChar char="•"/>
                 <a:defRPr/>
               </a:pPr>
               <a:r>
@@ -10372,7 +10578,24 @@
                   <a:latin typeface="Raleway" pitchFamily="2" charset="77"/>
                   <a:cs typeface="Helvetica" panose="020B0604020202020204" pitchFamily="34" charset="0"/>
                 </a:rPr>
-                <a:t>in patients awaiting follow-up from 3259 to 326 over 12 months. </a:t>
+                <a:t>in patients awaiting follow-up since these dates (within 12 months (from 3259 to 326).</a:t>
+              </a:r>
+            </a:p>
+            <a:p>
+              <a:pPr marL="285750" indent="-285750" defTabSz="1751511">
+                <a:buFont typeface="Arial" panose="020B0604020202020204" pitchFamily="34" charset="0"/>
+                <a:buChar char="•"/>
+                <a:defRPr/>
+              </a:pPr>
+              <a:r>
+                <a:rPr lang="en-GB" sz="1400" kern="0" dirty="0">
+                  <a:solidFill>
+                    <a:srgbClr val="000000"/>
+                  </a:solidFill>
+                  <a:latin typeface="Raleway" pitchFamily="2" charset="77"/>
+                  <a:cs typeface="Helvetica" panose="020B0604020202020204" pitchFamily="34" charset="0"/>
+                </a:rPr>
+                <a:t>A </a:t>
               </a:r>
               <a:r>
                 <a:rPr lang="en-GB" sz="1400" b="1" kern="0" dirty="0">
@@ -10382,7 +10605,7 @@
                   <a:latin typeface="Raleway" pitchFamily="2" charset="77"/>
                   <a:cs typeface="Helvetica" panose="020B0604020202020204" pitchFamily="34" charset="0"/>
                 </a:rPr>
-                <a:t>71% reduction achieved by 6 months.</a:t>
+                <a:t>71% reduction was achieved by 6 months (March 2022).</a:t>
               </a:r>
               <a:endParaRPr lang="en-GB" sz="1400" kern="0" dirty="0">
                 <a:solidFill>
@@ -10393,7 +10616,9 @@
               </a:endParaRPr>
             </a:p>
             <a:p>
-              <a:pPr defTabSz="1751511">
+              <a:pPr marL="285750" indent="-285750" defTabSz="1751511">
+                <a:buFont typeface="Arial" panose="020B0604020202020204" pitchFamily="34" charset="0"/>
+                <a:buChar char="•"/>
                 <a:defRPr/>
               </a:pPr>
               <a:r>
@@ -10404,7 +10629,7 @@
                   <a:latin typeface="Raleway" pitchFamily="2" charset="77"/>
                   <a:cs typeface="Helvetica" panose="020B0604020202020204" pitchFamily="34" charset="0"/>
                 </a:rPr>
-                <a:t>This reduction was statistically significant and progressive (</a:t>
+                <a:t>This reduction was </a:t>
               </a:r>
               <a:r>
                 <a:rPr lang="en-GB" sz="1400" b="1" kern="0" dirty="0">
@@ -10414,7 +10639,17 @@
                   <a:latin typeface="Raleway" pitchFamily="2" charset="77"/>
                   <a:cs typeface="Helvetica" panose="020B0604020202020204" pitchFamily="34" charset="0"/>
                 </a:rPr>
-                <a:t>p&lt;0.001 - Chi-square test for trend).</a:t>
+                <a:t>statistically significant and progressive </a:t>
+              </a:r>
+              <a:r>
+                <a:rPr lang="en-GB" sz="1400" kern="0" dirty="0">
+                  <a:solidFill>
+                    <a:srgbClr val="000000"/>
+                  </a:solidFill>
+                  <a:latin typeface="Raleway" pitchFamily="2" charset="77"/>
+                  <a:cs typeface="Helvetica" panose="020B0604020202020204" pitchFamily="34" charset="0"/>
+                </a:rPr>
+                <a:t>(p&lt;0.001 - Chi-square test for trend).</a:t>
               </a:r>
             </a:p>
           </p:txBody>
@@ -10480,6 +10715,195 @@
           </a:prstGeom>
         </p:spPr>
       </p:pic>
+      <p:grpSp>
+        <p:nvGrpSpPr>
+          <p:cNvPr id="7" name="Group 6">
+            <a:extLst>
+              <a:ext uri="{FF2B5EF4-FFF2-40B4-BE49-F238E27FC236}">
+                <a16:creationId xmlns:a16="http://schemas.microsoft.com/office/drawing/2014/main" id="{53DE6D69-CF2D-54FA-9F3B-8B1A2B0E9202}"/>
+              </a:ext>
+            </a:extLst>
+          </p:cNvPr>
+          <p:cNvGrpSpPr/>
+          <p:nvPr/>
+        </p:nvGrpSpPr>
+        <p:grpSpPr>
+          <a:xfrm>
+            <a:off x="9750221" y="195411"/>
+            <a:ext cx="2216049" cy="1277251"/>
+            <a:chOff x="9750221" y="195411"/>
+            <a:chExt cx="2216049" cy="1277251"/>
+          </a:xfrm>
+        </p:grpSpPr>
+        <p:sp>
+          <p:nvSpPr>
+            <p:cNvPr id="8" name="Google Shape;191;p10">
+              <a:extLst>
+                <a:ext uri="{FF2B5EF4-FFF2-40B4-BE49-F238E27FC236}">
+                  <a16:creationId xmlns:a16="http://schemas.microsoft.com/office/drawing/2014/main" id="{6EE1A7EB-21C7-CDEB-3563-08080EC92755}"/>
+                </a:ext>
+              </a:extLst>
+            </p:cNvPr>
+            <p:cNvSpPr/>
+            <p:nvPr/>
+          </p:nvSpPr>
+          <p:spPr>
+            <a:xfrm>
+              <a:off x="9750221" y="359201"/>
+              <a:ext cx="2216049" cy="1113461"/>
+            </a:xfrm>
+            <a:custGeom>
+              <a:avLst/>
+              <a:gdLst/>
+              <a:ahLst/>
+              <a:cxnLst/>
+              <a:rect l="l" t="t" r="r" b="b"/>
+              <a:pathLst>
+                <a:path w="3379367" h="2027620" extrusionOk="0">
+                  <a:moveTo>
+                    <a:pt x="0" y="0"/>
+                  </a:moveTo>
+                  <a:lnTo>
+                    <a:pt x="3379367" y="0"/>
+                  </a:lnTo>
+                  <a:lnTo>
+                    <a:pt x="3379367" y="2027620"/>
+                  </a:lnTo>
+                  <a:lnTo>
+                    <a:pt x="0" y="2027620"/>
+                  </a:lnTo>
+                  <a:lnTo>
+                    <a:pt x="0" y="0"/>
+                  </a:lnTo>
+                  <a:close/>
+                </a:path>
+              </a:pathLst>
+            </a:custGeom>
+            <a:noFill/>
+            <a:ln>
+              <a:noFill/>
+            </a:ln>
+          </p:spPr>
+          <p:txBody>
+            <a:bodyPr spcFirstLastPara="1" wrap="square" lIns="360000" tIns="450000" rIns="360000" bIns="360000" anchor="t" anchorCtr="0">
+              <a:noAutofit/>
+            </a:bodyPr>
+            <a:lstStyle/>
+            <a:p>
+              <a:pPr marL="0" marR="0" lvl="1" indent="0" rtl="0">
+                <a:lnSpc>
+                  <a:spcPct val="90000"/>
+                </a:lnSpc>
+                <a:spcBef>
+                  <a:spcPts val="0"/>
+                </a:spcBef>
+                <a:spcAft>
+                  <a:spcPts val="0"/>
+                </a:spcAft>
+                <a:buClr>
+                  <a:srgbClr val="000000"/>
+                </a:buClr>
+                <a:buSzPts val="1200"/>
+                <a:buFont typeface="Raleway"/>
+                <a:buNone/>
+              </a:pPr>
+              <a:r>
+                <a:rPr lang="en-GB" sz="1400" b="1" i="0" u="none" strike="noStrike" cap="none" dirty="0">
+                  <a:solidFill>
+                    <a:srgbClr val="C00000"/>
+                  </a:solidFill>
+                  <a:latin typeface="Raleway"/>
+                  <a:ea typeface="Raleway"/>
+                  <a:cs typeface="Raleway"/>
+                  <a:sym typeface="Raleway"/>
+                </a:rPr>
+                <a:t>Scan the QR Code for more detail!</a:t>
+              </a:r>
+            </a:p>
+            <a:p>
+              <a:pPr marL="0" marR="0" lvl="1" indent="0" algn="l" rtl="0">
+                <a:lnSpc>
+                  <a:spcPct val="90000"/>
+                </a:lnSpc>
+                <a:spcBef>
+                  <a:spcPts val="0"/>
+                </a:spcBef>
+                <a:spcAft>
+                  <a:spcPts val="0"/>
+                </a:spcAft>
+                <a:buClr>
+                  <a:srgbClr val="000000"/>
+                </a:buClr>
+                <a:buSzPts val="1200"/>
+                <a:buFont typeface="Raleway"/>
+                <a:buNone/>
+              </a:pPr>
+              <a:endParaRPr lang="en-GB" sz="1400" b="1" i="0" u="none" strike="noStrike" cap="none" dirty="0">
+                <a:solidFill>
+                  <a:srgbClr val="C00000"/>
+                </a:solidFill>
+                <a:latin typeface="Raleway"/>
+                <a:ea typeface="Raleway"/>
+                <a:cs typeface="Raleway"/>
+                <a:sym typeface="Raleway"/>
+              </a:endParaRPr>
+            </a:p>
+          </p:txBody>
+        </p:sp>
+        <p:sp>
+          <p:nvSpPr>
+            <p:cNvPr id="10" name="Arc 9">
+              <a:extLst>
+                <a:ext uri="{FF2B5EF4-FFF2-40B4-BE49-F238E27FC236}">
+                  <a16:creationId xmlns:a16="http://schemas.microsoft.com/office/drawing/2014/main" id="{48E76F06-8665-9BBA-9CCF-322A3D8F4864}"/>
+                </a:ext>
+              </a:extLst>
+            </p:cNvPr>
+            <p:cNvSpPr/>
+            <p:nvPr/>
+          </p:nvSpPr>
+          <p:spPr>
+            <a:xfrm rot="1406549" flipV="1">
+              <a:off x="11265460" y="195411"/>
+              <a:ext cx="632327" cy="1042879"/>
+            </a:xfrm>
+            <a:prstGeom prst="arc">
+              <a:avLst/>
+            </a:prstGeom>
+            <a:ln w="38100" cap="flat" cmpd="sng" algn="ctr">
+              <a:solidFill>
+                <a:schemeClr val="accent1"/>
+              </a:solidFill>
+              <a:prstDash val="solid"/>
+              <a:round/>
+              <a:headEnd type="none" w="med" len="med"/>
+              <a:tailEnd type="arrow" w="med" len="med"/>
+            </a:ln>
+          </p:spPr>
+          <p:style>
+            <a:lnRef idx="0">
+              <a:scrgbClr r="0" g="0" b="0"/>
+            </a:lnRef>
+            <a:fillRef idx="0">
+              <a:scrgbClr r="0" g="0" b="0"/>
+            </a:fillRef>
+            <a:effectRef idx="0">
+              <a:scrgbClr r="0" g="0" b="0"/>
+            </a:effectRef>
+            <a:fontRef idx="minor">
+              <a:schemeClr val="tx1"/>
+            </a:fontRef>
+          </p:style>
+          <p:txBody>
+            <a:bodyPr rtlCol="0" anchor="ctr"/>
+            <a:lstStyle/>
+            <a:p>
+              <a:pPr algn="ctr"/>
+              <a:endParaRPr lang="en-US"/>
+            </a:p>
+          </p:txBody>
+        </p:sp>
+      </p:grpSp>
     </p:spTree>
   </p:cSld>
   <p:clrMapOvr>
@@ -11970,80 +12394,130 @@
           </a:prstGeom>
         </p:spPr>
       </p:pic>
-      <p:sp>
-        <p:nvSpPr>
-          <p:cNvPr id="7" name="Google Shape;191;p10">
+      <p:grpSp>
+        <p:nvGrpSpPr>
+          <p:cNvPr id="23" name="Group 22">
             <a:extLst>
               <a:ext uri="{FF2B5EF4-FFF2-40B4-BE49-F238E27FC236}">
-                <a16:creationId xmlns:a16="http://schemas.microsoft.com/office/drawing/2014/main" id="{868DE7B7-52D2-65FB-DEAC-B3B629AB55C1}"/>
+                <a16:creationId xmlns:a16="http://schemas.microsoft.com/office/drawing/2014/main" id="{95297B6F-29BE-5E8A-101B-E1B1DE38DB4F}"/>
               </a:ext>
             </a:extLst>
           </p:cNvPr>
-          <p:cNvSpPr/>
+          <p:cNvGrpSpPr/>
           <p:nvPr/>
-        </p:nvSpPr>
-        <p:spPr>
+        </p:nvGrpSpPr>
+        <p:grpSpPr>
           <a:xfrm>
-            <a:off x="9750221" y="359201"/>
-            <a:ext cx="2216049" cy="1113461"/>
+            <a:off x="9750221" y="195411"/>
+            <a:ext cx="2216049" cy="1277251"/>
+            <a:chOff x="9750221" y="195411"/>
+            <a:chExt cx="2216049" cy="1277251"/>
           </a:xfrm>
-          <a:custGeom>
-            <a:avLst/>
-            <a:gdLst/>
-            <a:ahLst/>
-            <a:cxnLst/>
-            <a:rect l="l" t="t" r="r" b="b"/>
-            <a:pathLst>
-              <a:path w="3379367" h="2027620" extrusionOk="0">
-                <a:moveTo>
-                  <a:pt x="0" y="0"/>
-                </a:moveTo>
-                <a:lnTo>
-                  <a:pt x="3379367" y="0"/>
-                </a:lnTo>
-                <a:lnTo>
-                  <a:pt x="3379367" y="2027620"/>
-                </a:lnTo>
-                <a:lnTo>
-                  <a:pt x="0" y="2027620"/>
-                </a:lnTo>
-                <a:lnTo>
-                  <a:pt x="0" y="0"/>
-                </a:lnTo>
-                <a:close/>
-              </a:path>
-            </a:pathLst>
-          </a:custGeom>
-          <a:noFill/>
-          <a:ln>
+        </p:grpSpPr>
+        <p:sp>
+          <p:nvSpPr>
+            <p:cNvPr id="7" name="Google Shape;191;p10">
+              <a:extLst>
+                <a:ext uri="{FF2B5EF4-FFF2-40B4-BE49-F238E27FC236}">
+                  <a16:creationId xmlns:a16="http://schemas.microsoft.com/office/drawing/2014/main" id="{868DE7B7-52D2-65FB-DEAC-B3B629AB55C1}"/>
+                </a:ext>
+              </a:extLst>
+            </p:cNvPr>
+            <p:cNvSpPr/>
+            <p:nvPr/>
+          </p:nvSpPr>
+          <p:spPr>
+            <a:xfrm>
+              <a:off x="9750221" y="359201"/>
+              <a:ext cx="2216049" cy="1113461"/>
+            </a:xfrm>
+            <a:custGeom>
+              <a:avLst/>
+              <a:gdLst/>
+              <a:ahLst/>
+              <a:cxnLst/>
+              <a:rect l="l" t="t" r="r" b="b"/>
+              <a:pathLst>
+                <a:path w="3379367" h="2027620" extrusionOk="0">
+                  <a:moveTo>
+                    <a:pt x="0" y="0"/>
+                  </a:moveTo>
+                  <a:lnTo>
+                    <a:pt x="3379367" y="0"/>
+                  </a:lnTo>
+                  <a:lnTo>
+                    <a:pt x="3379367" y="2027620"/>
+                  </a:lnTo>
+                  <a:lnTo>
+                    <a:pt x="0" y="2027620"/>
+                  </a:lnTo>
+                  <a:lnTo>
+                    <a:pt x="0" y="0"/>
+                  </a:lnTo>
+                  <a:close/>
+                </a:path>
+              </a:pathLst>
+            </a:custGeom>
             <a:noFill/>
-          </a:ln>
-        </p:spPr>
-        <p:txBody>
-          <a:bodyPr spcFirstLastPara="1" wrap="square" lIns="360000" tIns="450000" rIns="360000" bIns="360000" anchor="t" anchorCtr="0">
-            <a:noAutofit/>
-          </a:bodyPr>
-          <a:lstStyle/>
-          <a:p>
-            <a:pPr marL="0" marR="0" lvl="1" indent="0" rtl="0">
-              <a:lnSpc>
-                <a:spcPct val="90000"/>
-              </a:lnSpc>
-              <a:spcBef>
-                <a:spcPts val="0"/>
-              </a:spcBef>
-              <a:spcAft>
-                <a:spcPts val="0"/>
-              </a:spcAft>
-              <a:buClr>
-                <a:srgbClr val="000000"/>
-              </a:buClr>
-              <a:buSzPts val="1200"/>
-              <a:buFont typeface="Raleway"/>
-              <a:buNone/>
-            </a:pPr>
-            <a:r>
-              <a:rPr lang="en-GB" sz="1400" b="1" i="0" u="none" strike="noStrike" cap="none" dirty="0">
+            <a:ln>
+              <a:noFill/>
+            </a:ln>
+          </p:spPr>
+          <p:txBody>
+            <a:bodyPr spcFirstLastPara="1" wrap="square" lIns="360000" tIns="450000" rIns="360000" bIns="360000" anchor="t" anchorCtr="0">
+              <a:noAutofit/>
+            </a:bodyPr>
+            <a:lstStyle/>
+            <a:p>
+              <a:pPr marL="0" marR="0" lvl="1" indent="0" rtl="0">
+                <a:lnSpc>
+                  <a:spcPct val="90000"/>
+                </a:lnSpc>
+                <a:spcBef>
+                  <a:spcPts val="0"/>
+                </a:spcBef>
+                <a:spcAft>
+                  <a:spcPts val="0"/>
+                </a:spcAft>
+                <a:buClr>
+                  <a:srgbClr val="000000"/>
+                </a:buClr>
+                <a:buSzPts val="1200"/>
+                <a:buFont typeface="Raleway"/>
+                <a:buNone/>
+              </a:pPr>
+              <a:r>
+                <a:rPr lang="en-GB" sz="1400" b="1" i="0" u="none" strike="noStrike" cap="none" dirty="0">
+                  <a:solidFill>
+                    <a:srgbClr val="C00000"/>
+                  </a:solidFill>
+                  <a:latin typeface="Raleway"/>
+                  <a:ea typeface="Raleway"/>
+                  <a:cs typeface="Raleway"/>
+                  <a:sym typeface="Raleway"/>
+                </a:rPr>
+                <a:t>Scan the QR Code for more detail!</a:t>
+              </a:r>
+            </a:p>
+            <a:p>
+              <a:pPr marL="0" marR="0" lvl="1" indent="0" algn="l" rtl="0">
+                <a:lnSpc>
+                  <a:spcPct val="90000"/>
+                </a:lnSpc>
+                <a:spcBef>
+                  <a:spcPts val="0"/>
+                </a:spcBef>
+                <a:spcAft>
+                  <a:spcPts val="0"/>
+                </a:spcAft>
+                <a:buClr>
+                  <a:srgbClr val="000000"/>
+                </a:buClr>
+                <a:buSzPts val="1200"/>
+                <a:buFont typeface="Raleway"/>
+                <a:buNone/>
+              </a:pPr>
+              <a:endParaRPr lang="en-GB" sz="1400" b="1" i="0" u="none" strike="noStrike" cap="none" dirty="0">
                 <a:solidFill>
                   <a:srgbClr val="C00000"/>
                 </a:solidFill>
@@ -12051,93 +12525,64 @@
                 <a:ea typeface="Raleway"/>
                 <a:cs typeface="Raleway"/>
                 <a:sym typeface="Raleway"/>
-              </a:rPr>
-              <a:t>Scan the QR Code for more detail!</a:t>
-            </a:r>
-          </a:p>
-          <a:p>
-            <a:pPr marL="0" marR="0" lvl="1" indent="0" algn="l" rtl="0">
-              <a:lnSpc>
-                <a:spcPct val="90000"/>
-              </a:lnSpc>
-              <a:spcBef>
-                <a:spcPts val="0"/>
-              </a:spcBef>
-              <a:spcAft>
-                <a:spcPts val="0"/>
-              </a:spcAft>
-              <a:buClr>
-                <a:srgbClr val="000000"/>
-              </a:buClr>
-              <a:buSzPts val="1200"/>
-              <a:buFont typeface="Raleway"/>
-              <a:buNone/>
-            </a:pPr>
-            <a:endParaRPr lang="en-GB" sz="1400" b="1" i="0" u="none" strike="noStrike" cap="none" dirty="0">
+              </a:endParaRPr>
+            </a:p>
+          </p:txBody>
+        </p:sp>
+        <p:sp>
+          <p:nvSpPr>
+            <p:cNvPr id="22" name="Arc 21">
+              <a:extLst>
+                <a:ext uri="{FF2B5EF4-FFF2-40B4-BE49-F238E27FC236}">
+                  <a16:creationId xmlns:a16="http://schemas.microsoft.com/office/drawing/2014/main" id="{3489D4F4-BE9E-56A0-84AC-499C2EB77C03}"/>
+                </a:ext>
+              </a:extLst>
+            </p:cNvPr>
+            <p:cNvSpPr/>
+            <p:nvPr/>
+          </p:nvSpPr>
+          <p:spPr>
+            <a:xfrm rot="1406549" flipV="1">
+              <a:off x="11265460" y="195411"/>
+              <a:ext cx="632327" cy="1042879"/>
+            </a:xfrm>
+            <a:prstGeom prst="arc">
+              <a:avLst/>
+            </a:prstGeom>
+            <a:ln w="38100" cap="flat" cmpd="sng" algn="ctr">
               <a:solidFill>
-                <a:srgbClr val="C00000"/>
+                <a:schemeClr val="accent1"/>
               </a:solidFill>
-              <a:latin typeface="Raleway"/>
-              <a:ea typeface="Raleway"/>
-              <a:cs typeface="Raleway"/>
-              <a:sym typeface="Raleway"/>
-            </a:endParaRPr>
-          </a:p>
-        </p:txBody>
-      </p:sp>
-      <p:sp>
-        <p:nvSpPr>
-          <p:cNvPr id="22" name="Arc 21">
-            <a:extLst>
-              <a:ext uri="{FF2B5EF4-FFF2-40B4-BE49-F238E27FC236}">
-                <a16:creationId xmlns:a16="http://schemas.microsoft.com/office/drawing/2014/main" id="{3489D4F4-BE9E-56A0-84AC-499C2EB77C03}"/>
-              </a:ext>
-            </a:extLst>
-          </p:cNvPr>
-          <p:cNvSpPr/>
-          <p:nvPr/>
-        </p:nvSpPr>
-        <p:spPr>
-          <a:xfrm rot="1406549" flipV="1">
-            <a:off x="11265460" y="195411"/>
-            <a:ext cx="632327" cy="1042879"/>
-          </a:xfrm>
-          <a:prstGeom prst="arc">
-            <a:avLst/>
-          </a:prstGeom>
-          <a:ln w="38100" cap="flat" cmpd="sng" algn="ctr">
-            <a:solidFill>
-              <a:schemeClr val="accent1"/>
-            </a:solidFill>
-            <a:prstDash val="solid"/>
-            <a:round/>
-            <a:headEnd type="none" w="med" len="med"/>
-            <a:tailEnd type="arrow" w="med" len="med"/>
-          </a:ln>
-        </p:spPr>
-        <p:style>
-          <a:lnRef idx="0">
-            <a:scrgbClr r="0" g="0" b="0"/>
-          </a:lnRef>
-          <a:fillRef idx="0">
-            <a:scrgbClr r="0" g="0" b="0"/>
-          </a:fillRef>
-          <a:effectRef idx="0">
-            <a:scrgbClr r="0" g="0" b="0"/>
-          </a:effectRef>
-          <a:fontRef idx="minor">
-            <a:schemeClr val="tx1"/>
-          </a:fontRef>
-        </p:style>
-        <p:txBody>
-          <a:bodyPr rtlCol="0" anchor="ctr"/>
-          <a:lstStyle/>
-          <a:p>
-            <a:pPr algn="ctr"/>
-            <a:endParaRPr lang="en-US"/>
-          </a:p>
-        </p:txBody>
-      </p:sp>
+              <a:prstDash val="solid"/>
+              <a:round/>
+              <a:headEnd type="none" w="med" len="med"/>
+              <a:tailEnd type="arrow" w="med" len="med"/>
+            </a:ln>
+          </p:spPr>
+          <p:style>
+            <a:lnRef idx="0">
+              <a:scrgbClr r="0" g="0" b="0"/>
+            </a:lnRef>
+            <a:fillRef idx="0">
+              <a:scrgbClr r="0" g="0" b="0"/>
+            </a:fillRef>
+            <a:effectRef idx="0">
+              <a:scrgbClr r="0" g="0" b="0"/>
+            </a:effectRef>
+            <a:fontRef idx="minor">
+              <a:schemeClr val="tx1"/>
+            </a:fontRef>
+          </p:style>
+          <p:txBody>
+            <a:bodyPr rtlCol="0" anchor="ctr"/>
+            <a:lstStyle/>
+            <a:p>
+              <a:pPr algn="ctr"/>
+              <a:endParaRPr lang="en-US"/>
+            </a:p>
+          </p:txBody>
+        </p:sp>
+      </p:grpSp>
     </p:spTree>
   </p:cSld>
   <p:clrMapOvr>
@@ -12370,78 +12815,6 @@
                       </p:childTnLst>
                     </p:cTn>
                   </p:par>
-                  <p:par>
-                    <p:cTn id="22" fill="hold">
-                      <p:stCondLst>
-                        <p:cond delay="indefinite"/>
-                      </p:stCondLst>
-                      <p:childTnLst>
-                        <p:par>
-                          <p:cTn id="23" fill="hold">
-                            <p:stCondLst>
-                              <p:cond delay="0"/>
-                            </p:stCondLst>
-                            <p:childTnLst>
-                              <p:par>
-                                <p:cTn id="24" presetID="1" presetClass="entr" presetSubtype="0" fill="hold" grpId="0" nodeType="clickEffect">
-                                  <p:stCondLst>
-                                    <p:cond delay="0"/>
-                                  </p:stCondLst>
-                                  <p:childTnLst>
-                                    <p:set>
-                                      <p:cBhvr>
-                                        <p:cTn id="25" dur="1" fill="hold">
-                                          <p:stCondLst>
-                                            <p:cond delay="0"/>
-                                          </p:stCondLst>
-                                        </p:cTn>
-                                        <p:tgtEl>
-                                          <p:spTgt spid="7"/>
-                                        </p:tgtEl>
-                                        <p:attrNameLst>
-                                          <p:attrName>style.visibility</p:attrName>
-                                        </p:attrNameLst>
-                                      </p:cBhvr>
-                                      <p:to>
-                                        <p:strVal val="visible"/>
-                                      </p:to>
-                                    </p:set>
-                                  </p:childTnLst>
-                                </p:cTn>
-                              </p:par>
-                              <p:par>
-                                <p:cTn id="26" presetID="1" presetClass="entr" presetSubtype="0" fill="hold" grpId="0" nodeType="withEffect">
-                                  <p:stCondLst>
-                                    <p:cond delay="0"/>
-                                  </p:stCondLst>
-                                  <p:childTnLst>
-                                    <p:set>
-                                      <p:cBhvr>
-                                        <p:cTn id="27" dur="1" fill="hold">
-                                          <p:stCondLst>
-                                            <p:cond delay="0"/>
-                                          </p:stCondLst>
-                                        </p:cTn>
-                                        <p:tgtEl>
-                                          <p:spTgt spid="22"/>
-                                        </p:tgtEl>
-                                        <p:attrNameLst>
-                                          <p:attrName>style.visibility</p:attrName>
-                                        </p:attrNameLst>
-                                      </p:cBhvr>
-                                      <p:to>
-                                        <p:strVal val="visible"/>
-                                      </p:to>
-                                    </p:set>
-                                  </p:childTnLst>
-                                </p:cTn>
-                              </p:par>
-                            </p:childTnLst>
-                          </p:cTn>
-                        </p:par>
-                      </p:childTnLst>
-                    </p:cTn>
-                  </p:par>
                 </p:childTnLst>
               </p:cTn>
               <p:prevCondLst>
@@ -12463,10 +12836,6 @@
         </p:cTn>
       </p:par>
     </p:tnLst>
-    <p:bldLst>
-      <p:bldP spid="7" grpId="0"/>
-      <p:bldP spid="22" grpId="0" animBg="1"/>
-    </p:bldLst>
   </p:timing>
 </p:sld>
 </file>

</xml_diff>